<commit_message>
upload in 1/8 morning
</commit_message>
<xml_diff>
--- a/ppt/yyx_v1.0.pptx
+++ b/ppt/yyx_v1.0.pptx
@@ -17404,14 +17404,21 @@
           <a:p>
             <a:r>
               <a:rPr lang="zh-CN" altLang="en-US" sz="3200" dirty="0"/>
-              <a:t>前期调研结果</a:t>
+              <a:t>课题目标</a:t>
             </a:r>
             <a:endParaRPr lang="en-US" altLang="zh-CN" sz="3200" dirty="0"/>
           </a:p>
           <a:p>
             <a:r>
               <a:rPr lang="zh-CN" altLang="en-US" sz="3200" dirty="0"/>
-              <a:t>课题目标</a:t>
+              <a:t>前期调研</a:t>
+            </a:r>
+            <a:endParaRPr lang="en-US" altLang="zh-CN" sz="3200" dirty="0"/>
+          </a:p>
+          <a:p>
+            <a:r>
+              <a:rPr lang="zh-CN" altLang="en-US" sz="3200" dirty="0"/>
+              <a:t>实施方案</a:t>
             </a:r>
             <a:endParaRPr lang="en-US" altLang="zh-CN" sz="3200" dirty="0"/>
           </a:p>

</xml_diff>

<commit_message>
little change in 5309
</commit_message>
<xml_diff>
--- a/ppt/yyx_v1.0.pptx
+++ b/ppt/yyx_v1.0.pptx
@@ -12774,13 +12774,18 @@
           <a:lstStyle/>
           <a:p>
             <a:r>
-              <a:rPr lang="en-US" altLang="zh-CN" sz="1050" dirty="0">
+              <a:rPr lang="en-US" altLang="zh-CN" sz="1050" dirty="0" smtClean="0">
                 <a:solidFill>
                   <a:srgbClr val="000000"/>
                 </a:solidFill>
               </a:rPr>
-              <a:t>1/22</a:t>
-            </a:r>
+              <a:t>1/14</a:t>
+            </a:r>
+            <a:endParaRPr lang="en-US" altLang="zh-CN" sz="1050" dirty="0">
+              <a:solidFill>
+                <a:srgbClr val="000000"/>
+              </a:solidFill>
+            </a:endParaRPr>
           </a:p>
         </p:txBody>
       </p:sp>
@@ -12814,67 +12819,577 @@
           <a:chExt cx="0" cy="0"/>
         </a:xfrm>
       </p:grpSpPr>
-      <p:sp>
-        <p:nvSpPr>
-          <p:cNvPr id="2" name="标题 1"/>
-          <p:cNvSpPr>
-            <a:spLocks noGrp="1"/>
-          </p:cNvSpPr>
-          <p:nvPr>
-            <p:ph type="title"/>
-          </p:nvPr>
-        </p:nvSpPr>
-        <p:spPr/>
-        <p:txBody>
-          <a:bodyPr/>
-          <a:lstStyle/>
-          <a:p>
-            <a:r>
-              <a:rPr lang="zh-CN" altLang="en-US" sz="3600" dirty="0"/>
-              <a:t>前期调研结果</a:t>
-            </a:r>
-            <a:r>
-              <a:rPr lang="en-US" altLang="zh-CN" sz="3600" dirty="0"/>
-              <a:t>—</a:t>
-            </a:r>
-            <a:r>
-              <a:rPr lang="zh-CN" altLang="en-US" sz="3600" dirty="0"/>
-              <a:t>文献调研</a:t>
-            </a:r>
-          </a:p>
-        </p:txBody>
-      </p:sp>
-      <p:sp>
-        <p:nvSpPr>
-          <p:cNvPr id="4" name="页脚占位符 3"/>
-          <p:cNvSpPr>
-            <a:spLocks noGrp="1"/>
-          </p:cNvSpPr>
-          <p:nvPr>
-            <p:ph type="ftr" sz="quarter" idx="11"/>
-          </p:nvPr>
-        </p:nvSpPr>
-        <p:spPr/>
-        <p:txBody>
-          <a:bodyPr/>
-          <a:lstStyle/>
-          <a:p>
-            <a:r>
-              <a:rPr lang="en-US" altLang="zh-CN">
-                <a:solidFill>
-                  <a:srgbClr val="000000"/>
-                </a:solidFill>
-              </a:rPr>
-              <a:t>20/22</a:t>
-            </a:r>
-            <a:endParaRPr lang="en-US" altLang="zh-CN" dirty="0">
-              <a:solidFill>
-                <a:srgbClr val="000000"/>
-              </a:solidFill>
-            </a:endParaRPr>
-          </a:p>
-        </p:txBody>
-      </p:sp>
+      <p:grpSp>
+        <p:nvGrpSpPr>
+          <p:cNvPr id="13" name="组合 12"/>
+          <p:cNvGrpSpPr/>
+          <p:nvPr/>
+        </p:nvGrpSpPr>
+        <p:grpSpPr>
+          <a:xfrm>
+            <a:off x="175491" y="2799335"/>
+            <a:ext cx="8876145" cy="7780921"/>
+            <a:chOff x="175491" y="2799335"/>
+            <a:chExt cx="8876145" cy="7780921"/>
+          </a:xfrm>
+        </p:grpSpPr>
+        <p:grpSp>
+          <p:nvGrpSpPr>
+            <p:cNvPr id="11" name="组合 10"/>
+            <p:cNvGrpSpPr/>
+            <p:nvPr/>
+          </p:nvGrpSpPr>
+          <p:grpSpPr>
+            <a:xfrm>
+              <a:off x="175491" y="2799335"/>
+              <a:ext cx="8876145" cy="5956738"/>
+              <a:chOff x="175491" y="2738582"/>
+              <a:chExt cx="8876145" cy="5956738"/>
+            </a:xfrm>
+          </p:grpSpPr>
+          <p:sp>
+            <p:nvSpPr>
+              <p:cNvPr id="7" name="文本框 6"/>
+              <p:cNvSpPr txBox="1"/>
+              <p:nvPr/>
+            </p:nvSpPr>
+            <p:spPr>
+              <a:xfrm>
+                <a:off x="175491" y="2738582"/>
+                <a:ext cx="8876145" cy="707886"/>
+              </a:xfrm>
+              <a:prstGeom prst="rect">
+                <a:avLst/>
+              </a:prstGeom>
+              <a:noFill/>
+            </p:spPr>
+            <p:txBody>
+              <a:bodyPr wrap="square" rtlCol="0">
+                <a:spAutoFit/>
+              </a:bodyPr>
+              <a:lstStyle/>
+              <a:p>
+                <a:r>
+                  <a:rPr lang="en-US" altLang="zh-CN" sz="2000" dirty="0"/>
+                  <a:t>[2] A direct digital frequency synthesizer with minimized tuning latency of 12ns</a:t>
+                </a:r>
+              </a:p>
+            </p:txBody>
+          </p:sp>
+          <p:sp>
+            <p:nvSpPr>
+              <p:cNvPr id="8" name="内容占位符 2"/>
+              <p:cNvSpPr txBox="1">
+                <a:spLocks/>
+              </p:cNvSpPr>
+              <p:nvPr/>
+            </p:nvSpPr>
+            <p:spPr bwMode="auto">
+              <a:xfrm>
+                <a:off x="217055" y="3529595"/>
+                <a:ext cx="8686800" cy="5165725"/>
+              </a:xfrm>
+              <a:prstGeom prst="rect">
+                <a:avLst/>
+              </a:prstGeom>
+              <a:noFill/>
+              <a:ln w="9525">
+                <a:noFill/>
+                <a:miter lim="800000"/>
+                <a:headEnd/>
+                <a:tailEnd/>
+              </a:ln>
+              <a:effectLst/>
+            </p:spPr>
+            <p:txBody>
+              <a:bodyPr vert="horz" wrap="square" lIns="91440" tIns="45720" rIns="91440" bIns="45720" numCol="1" anchor="t" anchorCtr="0" compatLnSpc="1">
+                <a:prstTxWarp prst="textNoShape">
+                  <a:avLst/>
+                </a:prstTxWarp>
+              </a:bodyPr>
+              <a:lstStyle>
+                <a:lvl1pPr marL="257175" indent="-257175" algn="l" rtl="0" fontAlgn="base">
+                  <a:spcBef>
+                    <a:spcPct val="20000"/>
+                  </a:spcBef>
+                  <a:spcAft>
+                    <a:spcPct val="0"/>
+                  </a:spcAft>
+                  <a:buChar char="•"/>
+                  <a:defRPr sz="2400">
+                    <a:solidFill>
+                      <a:schemeClr val="tx1"/>
+                    </a:solidFill>
+                    <a:latin typeface="Arial Unicode MS" pitchFamily="34" charset="-122"/>
+                    <a:ea typeface="Arial Unicode MS" pitchFamily="34" charset="-122"/>
+                    <a:cs typeface="Arial Unicode MS" pitchFamily="34" charset="-122"/>
+                  </a:defRPr>
+                </a:lvl1pPr>
+                <a:lvl2pPr marL="557213" indent="-214313" algn="l" rtl="0" fontAlgn="base">
+                  <a:spcBef>
+                    <a:spcPct val="20000"/>
+                  </a:spcBef>
+                  <a:spcAft>
+                    <a:spcPct val="0"/>
+                  </a:spcAft>
+                  <a:buChar char="–"/>
+                  <a:defRPr sz="2100">
+                    <a:solidFill>
+                      <a:schemeClr val="tx1"/>
+                    </a:solidFill>
+                    <a:latin typeface="Arial Unicode MS" pitchFamily="34" charset="-122"/>
+                    <a:ea typeface="Arial Unicode MS" pitchFamily="34" charset="-122"/>
+                    <a:cs typeface="Arial Unicode MS" pitchFamily="34" charset="-122"/>
+                  </a:defRPr>
+                </a:lvl2pPr>
+                <a:lvl3pPr marL="857250" indent="-171450" algn="l" rtl="0" fontAlgn="base">
+                  <a:spcBef>
+                    <a:spcPct val="20000"/>
+                  </a:spcBef>
+                  <a:spcAft>
+                    <a:spcPct val="0"/>
+                  </a:spcAft>
+                  <a:buChar char="•"/>
+                  <a:defRPr sz="1800">
+                    <a:solidFill>
+                      <a:schemeClr val="tx1"/>
+                    </a:solidFill>
+                    <a:latin typeface="Arial Unicode MS" pitchFamily="34" charset="-122"/>
+                    <a:ea typeface="Arial Unicode MS" pitchFamily="34" charset="-122"/>
+                    <a:cs typeface="Arial Unicode MS" pitchFamily="34" charset="-122"/>
+                  </a:defRPr>
+                </a:lvl3pPr>
+                <a:lvl4pPr marL="1200150" indent="-171450" algn="l" rtl="0" fontAlgn="base">
+                  <a:spcBef>
+                    <a:spcPct val="20000"/>
+                  </a:spcBef>
+                  <a:spcAft>
+                    <a:spcPct val="0"/>
+                  </a:spcAft>
+                  <a:buChar char="–"/>
+                  <a:defRPr sz="1500">
+                    <a:solidFill>
+                      <a:schemeClr val="tx1"/>
+                    </a:solidFill>
+                    <a:latin typeface="Arial Unicode MS" pitchFamily="34" charset="-122"/>
+                    <a:ea typeface="Arial Unicode MS" pitchFamily="34" charset="-122"/>
+                    <a:cs typeface="Arial Unicode MS" pitchFamily="34" charset="-122"/>
+                  </a:defRPr>
+                </a:lvl4pPr>
+                <a:lvl5pPr marL="1543050" indent="-171450" algn="l" rtl="0" fontAlgn="base">
+                  <a:spcBef>
+                    <a:spcPct val="20000"/>
+                  </a:spcBef>
+                  <a:spcAft>
+                    <a:spcPct val="0"/>
+                  </a:spcAft>
+                  <a:buChar char="»"/>
+                  <a:defRPr sz="1500">
+                    <a:solidFill>
+                      <a:schemeClr val="tx1"/>
+                    </a:solidFill>
+                    <a:latin typeface="Arial Unicode MS" pitchFamily="34" charset="-122"/>
+                    <a:ea typeface="Arial Unicode MS" pitchFamily="34" charset="-122"/>
+                    <a:cs typeface="Arial Unicode MS" pitchFamily="34" charset="-122"/>
+                  </a:defRPr>
+                </a:lvl5pPr>
+                <a:lvl6pPr marL="1885950" indent="-171450" algn="l" rtl="0" fontAlgn="base">
+                  <a:spcBef>
+                    <a:spcPct val="20000"/>
+                  </a:spcBef>
+                  <a:spcAft>
+                    <a:spcPct val="0"/>
+                  </a:spcAft>
+                  <a:buChar char="»"/>
+                  <a:defRPr sz="1500">
+                    <a:solidFill>
+                      <a:schemeClr val="tx1"/>
+                    </a:solidFill>
+                    <a:latin typeface="+mn-lt"/>
+                    <a:ea typeface="+mn-ea"/>
+                  </a:defRPr>
+                </a:lvl6pPr>
+                <a:lvl7pPr marL="2228850" indent="-171450" algn="l" rtl="0" fontAlgn="base">
+                  <a:spcBef>
+                    <a:spcPct val="20000"/>
+                  </a:spcBef>
+                  <a:spcAft>
+                    <a:spcPct val="0"/>
+                  </a:spcAft>
+                  <a:buChar char="»"/>
+                  <a:defRPr sz="1500">
+                    <a:solidFill>
+                      <a:schemeClr val="tx1"/>
+                    </a:solidFill>
+                    <a:latin typeface="+mn-lt"/>
+                    <a:ea typeface="+mn-ea"/>
+                  </a:defRPr>
+                </a:lvl7pPr>
+                <a:lvl8pPr marL="2571750" indent="-171450" algn="l" rtl="0" fontAlgn="base">
+                  <a:spcBef>
+                    <a:spcPct val="20000"/>
+                  </a:spcBef>
+                  <a:spcAft>
+                    <a:spcPct val="0"/>
+                  </a:spcAft>
+                  <a:buChar char="»"/>
+                  <a:defRPr sz="1500">
+                    <a:solidFill>
+                      <a:schemeClr val="tx1"/>
+                    </a:solidFill>
+                    <a:latin typeface="+mn-lt"/>
+                    <a:ea typeface="+mn-ea"/>
+                  </a:defRPr>
+                </a:lvl8pPr>
+                <a:lvl9pPr marL="2914650" indent="-171450" algn="l" rtl="0" fontAlgn="base">
+                  <a:spcBef>
+                    <a:spcPct val="20000"/>
+                  </a:spcBef>
+                  <a:spcAft>
+                    <a:spcPct val="0"/>
+                  </a:spcAft>
+                  <a:buChar char="»"/>
+                  <a:defRPr sz="1500">
+                    <a:solidFill>
+                      <a:schemeClr val="tx1"/>
+                    </a:solidFill>
+                    <a:latin typeface="+mn-lt"/>
+                    <a:ea typeface="+mn-ea"/>
+                  </a:defRPr>
+                </a:lvl9pPr>
+              </a:lstStyle>
+              <a:p>
+                <a:pPr>
+                  <a:spcBef>
+                    <a:spcPts val="0"/>
+                  </a:spcBef>
+                  <a:spcAft>
+                    <a:spcPts val="1200"/>
+                  </a:spcAft>
+                </a:pPr>
+                <a:r>
+                  <a:rPr lang="zh-CN" altLang="en-US" sz="2000" dirty="0"/>
+                  <a:t>面临问题：传统</a:t>
+                </a:r>
+                <a:r>
+                  <a:rPr lang="en-US" altLang="zh-CN" sz="2000" dirty="0"/>
+                  <a:t>CORDIC</a:t>
+                </a:r>
+                <a:r>
+                  <a:rPr lang="zh-CN" altLang="en-US" sz="2000" dirty="0"/>
+                  <a:t>方法流水级数长，导致切换延时很大</a:t>
+                </a:r>
+                <a:endParaRPr lang="en-US" altLang="zh-CN" sz="2000" dirty="0"/>
+              </a:p>
+              <a:p>
+                <a:pPr>
+                  <a:spcBef>
+                    <a:spcPts val="0"/>
+                  </a:spcBef>
+                  <a:spcAft>
+                    <a:spcPts val="1200"/>
+                  </a:spcAft>
+                </a:pPr>
+                <a:r>
+                  <a:rPr lang="zh-CN" altLang="en-US" sz="2000" dirty="0"/>
+                  <a:t>优化方法：使用混合策略，提出</a:t>
+                </a:r>
+                <a:r>
+                  <a:rPr lang="en-US" altLang="zh-CN" sz="2000" dirty="0"/>
+                  <a:t>excess-four</a:t>
+                </a:r>
+                <a:r>
+                  <a:rPr lang="zh-CN" altLang="en-US" sz="2000" dirty="0"/>
+                  <a:t>电路结构</a:t>
+                </a:r>
+                <a:endParaRPr lang="en-US" altLang="zh-CN" sz="2000" dirty="0"/>
+              </a:p>
+            </p:txBody>
+          </p:sp>
+        </p:grpSp>
+        <p:grpSp>
+          <p:nvGrpSpPr>
+            <p:cNvPr id="3" name="组合 2"/>
+            <p:cNvGrpSpPr/>
+            <p:nvPr/>
+          </p:nvGrpSpPr>
+          <p:grpSpPr>
+            <a:xfrm>
+              <a:off x="175491" y="4623518"/>
+              <a:ext cx="8876145" cy="5956738"/>
+              <a:chOff x="175491" y="4562765"/>
+              <a:chExt cx="8876145" cy="5956738"/>
+            </a:xfrm>
+          </p:grpSpPr>
+          <p:sp>
+            <p:nvSpPr>
+              <p:cNvPr id="9" name="文本框 8"/>
+              <p:cNvSpPr txBox="1"/>
+              <p:nvPr/>
+            </p:nvSpPr>
+            <p:spPr>
+              <a:xfrm>
+                <a:off x="175491" y="4562765"/>
+                <a:ext cx="8876145" cy="707886"/>
+              </a:xfrm>
+              <a:prstGeom prst="rect">
+                <a:avLst/>
+              </a:prstGeom>
+              <a:noFill/>
+            </p:spPr>
+            <p:txBody>
+              <a:bodyPr wrap="square" rtlCol="0">
+                <a:spAutoFit/>
+              </a:bodyPr>
+              <a:lstStyle/>
+              <a:p>
+                <a:r>
+                  <a:rPr lang="en-US" altLang="zh-CN" sz="2000" dirty="0"/>
+                  <a:t>[3] A 2 GHz 130 </a:t>
+                </a:r>
+                <a:r>
+                  <a:rPr lang="en-US" altLang="zh-CN" sz="2000" dirty="0" err="1"/>
+                  <a:t>mW</a:t>
+                </a:r>
+                <a:r>
+                  <a:rPr lang="en-US" altLang="zh-CN" sz="2000" dirty="0"/>
+                  <a:t> Direct-Digital Frequency Synthesizer With a Nonlinear DAC in 55 nm CMOS</a:t>
+                </a:r>
+              </a:p>
+            </p:txBody>
+          </p:sp>
+          <p:sp>
+            <p:nvSpPr>
+              <p:cNvPr id="10" name="内容占位符 2"/>
+              <p:cNvSpPr txBox="1">
+                <a:spLocks/>
+              </p:cNvSpPr>
+              <p:nvPr/>
+            </p:nvSpPr>
+            <p:spPr bwMode="auto">
+              <a:xfrm>
+                <a:off x="217055" y="5353778"/>
+                <a:ext cx="8686800" cy="5165725"/>
+              </a:xfrm>
+              <a:prstGeom prst="rect">
+                <a:avLst/>
+              </a:prstGeom>
+              <a:noFill/>
+              <a:ln w="9525">
+                <a:noFill/>
+                <a:miter lim="800000"/>
+                <a:headEnd/>
+                <a:tailEnd/>
+              </a:ln>
+              <a:effectLst/>
+            </p:spPr>
+            <p:txBody>
+              <a:bodyPr vert="horz" wrap="square" lIns="91440" tIns="45720" rIns="91440" bIns="45720" numCol="1" anchor="t" anchorCtr="0" compatLnSpc="1">
+                <a:prstTxWarp prst="textNoShape">
+                  <a:avLst/>
+                </a:prstTxWarp>
+              </a:bodyPr>
+              <a:lstStyle>
+                <a:lvl1pPr marL="257175" indent="-257175" algn="l" rtl="0" fontAlgn="base">
+                  <a:spcBef>
+                    <a:spcPct val="20000"/>
+                  </a:spcBef>
+                  <a:spcAft>
+                    <a:spcPct val="0"/>
+                  </a:spcAft>
+                  <a:buChar char="•"/>
+                  <a:defRPr sz="2400">
+                    <a:solidFill>
+                      <a:schemeClr val="tx1"/>
+                    </a:solidFill>
+                    <a:latin typeface="Arial Unicode MS" pitchFamily="34" charset="-122"/>
+                    <a:ea typeface="Arial Unicode MS" pitchFamily="34" charset="-122"/>
+                    <a:cs typeface="Arial Unicode MS" pitchFamily="34" charset="-122"/>
+                  </a:defRPr>
+                </a:lvl1pPr>
+                <a:lvl2pPr marL="557213" indent="-214313" algn="l" rtl="0" fontAlgn="base">
+                  <a:spcBef>
+                    <a:spcPct val="20000"/>
+                  </a:spcBef>
+                  <a:spcAft>
+                    <a:spcPct val="0"/>
+                  </a:spcAft>
+                  <a:buChar char="–"/>
+                  <a:defRPr sz="2100">
+                    <a:solidFill>
+                      <a:schemeClr val="tx1"/>
+                    </a:solidFill>
+                    <a:latin typeface="Arial Unicode MS" pitchFamily="34" charset="-122"/>
+                    <a:ea typeface="Arial Unicode MS" pitchFamily="34" charset="-122"/>
+                    <a:cs typeface="Arial Unicode MS" pitchFamily="34" charset="-122"/>
+                  </a:defRPr>
+                </a:lvl2pPr>
+                <a:lvl3pPr marL="857250" indent="-171450" algn="l" rtl="0" fontAlgn="base">
+                  <a:spcBef>
+                    <a:spcPct val="20000"/>
+                  </a:spcBef>
+                  <a:spcAft>
+                    <a:spcPct val="0"/>
+                  </a:spcAft>
+                  <a:buChar char="•"/>
+                  <a:defRPr sz="1800">
+                    <a:solidFill>
+                      <a:schemeClr val="tx1"/>
+                    </a:solidFill>
+                    <a:latin typeface="Arial Unicode MS" pitchFamily="34" charset="-122"/>
+                    <a:ea typeface="Arial Unicode MS" pitchFamily="34" charset="-122"/>
+                    <a:cs typeface="Arial Unicode MS" pitchFamily="34" charset="-122"/>
+                  </a:defRPr>
+                </a:lvl3pPr>
+                <a:lvl4pPr marL="1200150" indent="-171450" algn="l" rtl="0" fontAlgn="base">
+                  <a:spcBef>
+                    <a:spcPct val="20000"/>
+                  </a:spcBef>
+                  <a:spcAft>
+                    <a:spcPct val="0"/>
+                  </a:spcAft>
+                  <a:buChar char="–"/>
+                  <a:defRPr sz="1500">
+                    <a:solidFill>
+                      <a:schemeClr val="tx1"/>
+                    </a:solidFill>
+                    <a:latin typeface="Arial Unicode MS" pitchFamily="34" charset="-122"/>
+                    <a:ea typeface="Arial Unicode MS" pitchFamily="34" charset="-122"/>
+                    <a:cs typeface="Arial Unicode MS" pitchFamily="34" charset="-122"/>
+                  </a:defRPr>
+                </a:lvl4pPr>
+                <a:lvl5pPr marL="1543050" indent="-171450" algn="l" rtl="0" fontAlgn="base">
+                  <a:spcBef>
+                    <a:spcPct val="20000"/>
+                  </a:spcBef>
+                  <a:spcAft>
+                    <a:spcPct val="0"/>
+                  </a:spcAft>
+                  <a:buChar char="»"/>
+                  <a:defRPr sz="1500">
+                    <a:solidFill>
+                      <a:schemeClr val="tx1"/>
+                    </a:solidFill>
+                    <a:latin typeface="Arial Unicode MS" pitchFamily="34" charset="-122"/>
+                    <a:ea typeface="Arial Unicode MS" pitchFamily="34" charset="-122"/>
+                    <a:cs typeface="Arial Unicode MS" pitchFamily="34" charset="-122"/>
+                  </a:defRPr>
+                </a:lvl5pPr>
+                <a:lvl6pPr marL="1885950" indent="-171450" algn="l" rtl="0" fontAlgn="base">
+                  <a:spcBef>
+                    <a:spcPct val="20000"/>
+                  </a:spcBef>
+                  <a:spcAft>
+                    <a:spcPct val="0"/>
+                  </a:spcAft>
+                  <a:buChar char="»"/>
+                  <a:defRPr sz="1500">
+                    <a:solidFill>
+                      <a:schemeClr val="tx1"/>
+                    </a:solidFill>
+                    <a:latin typeface="+mn-lt"/>
+                    <a:ea typeface="+mn-ea"/>
+                  </a:defRPr>
+                </a:lvl6pPr>
+                <a:lvl7pPr marL="2228850" indent="-171450" algn="l" rtl="0" fontAlgn="base">
+                  <a:spcBef>
+                    <a:spcPct val="20000"/>
+                  </a:spcBef>
+                  <a:spcAft>
+                    <a:spcPct val="0"/>
+                  </a:spcAft>
+                  <a:buChar char="»"/>
+                  <a:defRPr sz="1500">
+                    <a:solidFill>
+                      <a:schemeClr val="tx1"/>
+                    </a:solidFill>
+                    <a:latin typeface="+mn-lt"/>
+                    <a:ea typeface="+mn-ea"/>
+                  </a:defRPr>
+                </a:lvl7pPr>
+                <a:lvl8pPr marL="2571750" indent="-171450" algn="l" rtl="0" fontAlgn="base">
+                  <a:spcBef>
+                    <a:spcPct val="20000"/>
+                  </a:spcBef>
+                  <a:spcAft>
+                    <a:spcPct val="0"/>
+                  </a:spcAft>
+                  <a:buChar char="»"/>
+                  <a:defRPr sz="1500">
+                    <a:solidFill>
+                      <a:schemeClr val="tx1"/>
+                    </a:solidFill>
+                    <a:latin typeface="+mn-lt"/>
+                    <a:ea typeface="+mn-ea"/>
+                  </a:defRPr>
+                </a:lvl8pPr>
+                <a:lvl9pPr marL="2914650" indent="-171450" algn="l" rtl="0" fontAlgn="base">
+                  <a:spcBef>
+                    <a:spcPct val="20000"/>
+                  </a:spcBef>
+                  <a:spcAft>
+                    <a:spcPct val="0"/>
+                  </a:spcAft>
+                  <a:buChar char="»"/>
+                  <a:defRPr sz="1500">
+                    <a:solidFill>
+                      <a:schemeClr val="tx1"/>
+                    </a:solidFill>
+                    <a:latin typeface="+mn-lt"/>
+                    <a:ea typeface="+mn-ea"/>
+                  </a:defRPr>
+                </a:lvl9pPr>
+              </a:lstStyle>
+              <a:p>
+                <a:pPr>
+                  <a:spcBef>
+                    <a:spcPts val="0"/>
+                  </a:spcBef>
+                  <a:spcAft>
+                    <a:spcPts val="1200"/>
+                  </a:spcAft>
+                </a:pPr>
+                <a:r>
+                  <a:rPr lang="zh-CN" altLang="en-US" sz="2000" dirty="0"/>
+                  <a:t>面临问题：查找表和角度旋转方法，最长路径延时仍然很大</a:t>
+                </a:r>
+                <a:endParaRPr lang="en-US" altLang="zh-CN" sz="2000" dirty="0"/>
+              </a:p>
+              <a:p>
+                <a:pPr>
+                  <a:spcBef>
+                    <a:spcPts val="0"/>
+                  </a:spcBef>
+                  <a:spcAft>
+                    <a:spcPts val="1200"/>
+                  </a:spcAft>
+                </a:pPr>
+                <a:r>
+                  <a:rPr lang="zh-CN" altLang="en-US" sz="2000" dirty="0"/>
+                  <a:t>使用方法：使用非线性的</a:t>
+                </a:r>
+                <a:r>
+                  <a:rPr lang="en-US" altLang="zh-CN" sz="2000" dirty="0"/>
+                  <a:t>DAC</a:t>
+                </a:r>
+                <a:r>
+                  <a:rPr lang="zh-CN" altLang="en-US" sz="2000" dirty="0"/>
+                  <a:t>，压缩</a:t>
+                </a:r>
+                <a:r>
+                  <a:rPr lang="en-US" altLang="zh-CN" sz="2000" dirty="0"/>
+                  <a:t>DAC</a:t>
+                </a:r>
+                <a:r>
+                  <a:rPr lang="zh-CN" altLang="en-US" sz="2000" dirty="0"/>
+                  <a:t>中编解码器复杂度</a:t>
+                </a:r>
+                <a:endParaRPr lang="en-US" altLang="zh-CN" sz="2000" dirty="0"/>
+              </a:p>
+            </p:txBody>
+          </p:sp>
+        </p:grpSp>
+      </p:grpSp>
       <p:sp>
         <p:nvSpPr>
           <p:cNvPr id="5" name="文本框 4"/>
@@ -12916,8 +13431,8 @@
         </p:nvSpPr>
         <p:spPr>
           <a:xfrm>
-            <a:off x="217055" y="1631522"/>
-            <a:ext cx="8686800" cy="5165725"/>
+            <a:off x="175492" y="1692275"/>
+            <a:ext cx="8876144" cy="5165725"/>
           </a:xfrm>
         </p:spPr>
         <p:txBody>
@@ -12957,527 +13472,70 @@
       </p:sp>
       <p:sp>
         <p:nvSpPr>
-          <p:cNvPr id="7" name="文本框 6"/>
-          <p:cNvSpPr txBox="1"/>
-          <p:nvPr/>
-        </p:nvSpPr>
-        <p:spPr>
-          <a:xfrm>
-            <a:off x="175491" y="2738582"/>
-            <a:ext cx="8876145" cy="707886"/>
-          </a:xfrm>
-          <a:prstGeom prst="rect">
-            <a:avLst/>
-          </a:prstGeom>
-          <a:noFill/>
-        </p:spPr>
-        <p:txBody>
-          <a:bodyPr wrap="square" rtlCol="0">
-            <a:spAutoFit/>
-          </a:bodyPr>
+          <p:cNvPr id="2" name="标题 1"/>
+          <p:cNvSpPr>
+            <a:spLocks noGrp="1"/>
+          </p:cNvSpPr>
+          <p:nvPr>
+            <p:ph type="title"/>
+          </p:nvPr>
+        </p:nvSpPr>
+        <p:spPr/>
+        <p:txBody>
+          <a:bodyPr/>
           <a:lstStyle/>
           <a:p>
             <a:r>
-              <a:rPr lang="en-US" altLang="zh-CN" sz="2000" dirty="0"/>
-              <a:t>[2] A direct digital frequency synthesizer with minimized tuning latency of 12ns</a:t>
-            </a:r>
-          </a:p>
-        </p:txBody>
-      </p:sp>
-      <p:sp>
-        <p:nvSpPr>
-          <p:cNvPr id="8" name="内容占位符 2"/>
-          <p:cNvSpPr txBox="1">
-            <a:spLocks/>
-          </p:cNvSpPr>
-          <p:nvPr/>
-        </p:nvSpPr>
-        <p:spPr bwMode="auto">
-          <a:xfrm>
-            <a:off x="217055" y="3529595"/>
-            <a:ext cx="8686800" cy="5165725"/>
-          </a:xfrm>
-          <a:prstGeom prst="rect">
-            <a:avLst/>
-          </a:prstGeom>
-          <a:noFill/>
-          <a:ln w="9525">
-            <a:noFill/>
-            <a:miter lim="800000"/>
-            <a:headEnd/>
-            <a:tailEnd/>
-          </a:ln>
-          <a:effectLst/>
-        </p:spPr>
-        <p:txBody>
-          <a:bodyPr vert="horz" wrap="square" lIns="91440" tIns="45720" rIns="91440" bIns="45720" numCol="1" anchor="t" anchorCtr="0" compatLnSpc="1">
-            <a:prstTxWarp prst="textNoShape">
-              <a:avLst/>
-            </a:prstTxWarp>
-          </a:bodyPr>
-          <a:lstStyle>
-            <a:lvl1pPr marL="257175" indent="-257175" algn="l" rtl="0" fontAlgn="base">
-              <a:spcBef>
-                <a:spcPct val="20000"/>
-              </a:spcBef>
-              <a:spcAft>
-                <a:spcPct val="0"/>
-              </a:spcAft>
-              <a:buChar char="•"/>
-              <a:defRPr sz="2400">
+              <a:rPr lang="zh-CN" altLang="en-US" sz="3600" dirty="0"/>
+              <a:t>前期调研结果</a:t>
+            </a:r>
+            <a:r>
+              <a:rPr lang="en-US" altLang="zh-CN" sz="3600" dirty="0"/>
+              <a:t>—</a:t>
+            </a:r>
+            <a:r>
+              <a:rPr lang="zh-CN" altLang="en-US" sz="3600" dirty="0"/>
+              <a:t>文献调研</a:t>
+            </a:r>
+          </a:p>
+        </p:txBody>
+      </p:sp>
+      <p:sp>
+        <p:nvSpPr>
+          <p:cNvPr id="4" name="页脚占位符 3"/>
+          <p:cNvSpPr>
+            <a:spLocks noGrp="1"/>
+          </p:cNvSpPr>
+          <p:nvPr>
+            <p:ph type="ftr" sz="quarter" idx="11"/>
+          </p:nvPr>
+        </p:nvSpPr>
+        <p:spPr/>
+        <p:txBody>
+          <a:bodyPr/>
+          <a:lstStyle/>
+          <a:p>
+            <a:r>
+              <a:rPr lang="en-US" altLang="zh-CN" dirty="0" smtClean="0">
                 <a:solidFill>
-                  <a:schemeClr val="tx1"/>
+                  <a:srgbClr val="000000"/>
                 </a:solidFill>
-                <a:latin typeface="Arial Unicode MS" pitchFamily="34" charset="-122"/>
-                <a:ea typeface="Arial Unicode MS" pitchFamily="34" charset="-122"/>
-                <a:cs typeface="Arial Unicode MS" pitchFamily="34" charset="-122"/>
-              </a:defRPr>
-            </a:lvl1pPr>
-            <a:lvl2pPr marL="557213" indent="-214313" algn="l" rtl="0" fontAlgn="base">
-              <a:spcBef>
-                <a:spcPct val="20000"/>
-              </a:spcBef>
-              <a:spcAft>
-                <a:spcPct val="0"/>
-              </a:spcAft>
-              <a:buChar char="–"/>
-              <a:defRPr sz="2100">
+              </a:rPr>
+              <a:t>10</a:t>
+            </a:r>
+            <a:r>
+              <a:rPr lang="en-US" altLang="zh-CN" dirty="0" smtClean="0">
                 <a:solidFill>
-                  <a:schemeClr val="tx1"/>
+                  <a:srgbClr val="000000"/>
                 </a:solidFill>
-                <a:latin typeface="Arial Unicode MS" pitchFamily="34" charset="-122"/>
-                <a:ea typeface="Arial Unicode MS" pitchFamily="34" charset="-122"/>
-                <a:cs typeface="Arial Unicode MS" pitchFamily="34" charset="-122"/>
-              </a:defRPr>
-            </a:lvl2pPr>
-            <a:lvl3pPr marL="857250" indent="-171450" algn="l" rtl="0" fontAlgn="base">
-              <a:spcBef>
-                <a:spcPct val="20000"/>
-              </a:spcBef>
-              <a:spcAft>
-                <a:spcPct val="0"/>
-              </a:spcAft>
-              <a:buChar char="•"/>
-              <a:defRPr sz="1800">
-                <a:solidFill>
-                  <a:schemeClr val="tx1"/>
-                </a:solidFill>
-                <a:latin typeface="Arial Unicode MS" pitchFamily="34" charset="-122"/>
-                <a:ea typeface="Arial Unicode MS" pitchFamily="34" charset="-122"/>
-                <a:cs typeface="Arial Unicode MS" pitchFamily="34" charset="-122"/>
-              </a:defRPr>
-            </a:lvl3pPr>
-            <a:lvl4pPr marL="1200150" indent="-171450" algn="l" rtl="0" fontAlgn="base">
-              <a:spcBef>
-                <a:spcPct val="20000"/>
-              </a:spcBef>
-              <a:spcAft>
-                <a:spcPct val="0"/>
-              </a:spcAft>
-              <a:buChar char="–"/>
-              <a:defRPr sz="1500">
-                <a:solidFill>
-                  <a:schemeClr val="tx1"/>
-                </a:solidFill>
-                <a:latin typeface="Arial Unicode MS" pitchFamily="34" charset="-122"/>
-                <a:ea typeface="Arial Unicode MS" pitchFamily="34" charset="-122"/>
-                <a:cs typeface="Arial Unicode MS" pitchFamily="34" charset="-122"/>
-              </a:defRPr>
-            </a:lvl4pPr>
-            <a:lvl5pPr marL="1543050" indent="-171450" algn="l" rtl="0" fontAlgn="base">
-              <a:spcBef>
-                <a:spcPct val="20000"/>
-              </a:spcBef>
-              <a:spcAft>
-                <a:spcPct val="0"/>
-              </a:spcAft>
-              <a:buChar char="»"/>
-              <a:defRPr sz="1500">
-                <a:solidFill>
-                  <a:schemeClr val="tx1"/>
-                </a:solidFill>
-                <a:latin typeface="Arial Unicode MS" pitchFamily="34" charset="-122"/>
-                <a:ea typeface="Arial Unicode MS" pitchFamily="34" charset="-122"/>
-                <a:cs typeface="Arial Unicode MS" pitchFamily="34" charset="-122"/>
-              </a:defRPr>
-            </a:lvl5pPr>
-            <a:lvl6pPr marL="1885950" indent="-171450" algn="l" rtl="0" fontAlgn="base">
-              <a:spcBef>
-                <a:spcPct val="20000"/>
-              </a:spcBef>
-              <a:spcAft>
-                <a:spcPct val="0"/>
-              </a:spcAft>
-              <a:buChar char="»"/>
-              <a:defRPr sz="1500">
-                <a:solidFill>
-                  <a:schemeClr val="tx1"/>
-                </a:solidFill>
-                <a:latin typeface="+mn-lt"/>
-                <a:ea typeface="+mn-ea"/>
-              </a:defRPr>
-            </a:lvl6pPr>
-            <a:lvl7pPr marL="2228850" indent="-171450" algn="l" rtl="0" fontAlgn="base">
-              <a:spcBef>
-                <a:spcPct val="20000"/>
-              </a:spcBef>
-              <a:spcAft>
-                <a:spcPct val="0"/>
-              </a:spcAft>
-              <a:buChar char="»"/>
-              <a:defRPr sz="1500">
-                <a:solidFill>
-                  <a:schemeClr val="tx1"/>
-                </a:solidFill>
-                <a:latin typeface="+mn-lt"/>
-                <a:ea typeface="+mn-ea"/>
-              </a:defRPr>
-            </a:lvl7pPr>
-            <a:lvl8pPr marL="2571750" indent="-171450" algn="l" rtl="0" fontAlgn="base">
-              <a:spcBef>
-                <a:spcPct val="20000"/>
-              </a:spcBef>
-              <a:spcAft>
-                <a:spcPct val="0"/>
-              </a:spcAft>
-              <a:buChar char="»"/>
-              <a:defRPr sz="1500">
-                <a:solidFill>
-                  <a:schemeClr val="tx1"/>
-                </a:solidFill>
-                <a:latin typeface="+mn-lt"/>
-                <a:ea typeface="+mn-ea"/>
-              </a:defRPr>
-            </a:lvl8pPr>
-            <a:lvl9pPr marL="2914650" indent="-171450" algn="l" rtl="0" fontAlgn="base">
-              <a:spcBef>
-                <a:spcPct val="20000"/>
-              </a:spcBef>
-              <a:spcAft>
-                <a:spcPct val="0"/>
-              </a:spcAft>
-              <a:buChar char="»"/>
-              <a:defRPr sz="1500">
-                <a:solidFill>
-                  <a:schemeClr val="tx1"/>
-                </a:solidFill>
-                <a:latin typeface="+mn-lt"/>
-                <a:ea typeface="+mn-ea"/>
-              </a:defRPr>
-            </a:lvl9pPr>
-          </a:lstStyle>
-          <a:p>
-            <a:pPr>
-              <a:spcBef>
-                <a:spcPts val="0"/>
-              </a:spcBef>
-              <a:spcAft>
-                <a:spcPts val="1200"/>
-              </a:spcAft>
-            </a:pPr>
-            <a:r>
-              <a:rPr lang="zh-CN" altLang="en-US" sz="2000" dirty="0"/>
-              <a:t>面临问题：传统</a:t>
-            </a:r>
-            <a:r>
-              <a:rPr lang="en-US" altLang="zh-CN" sz="2000" dirty="0"/>
-              <a:t>CORDIC</a:t>
-            </a:r>
-            <a:r>
-              <a:rPr lang="zh-CN" altLang="en-US" sz="2000" dirty="0"/>
-              <a:t>方法流水级数长，导致切换延时很大</a:t>
-            </a:r>
-            <a:endParaRPr lang="en-US" altLang="zh-CN" sz="2000" dirty="0"/>
-          </a:p>
-          <a:p>
-            <a:pPr>
-              <a:spcBef>
-                <a:spcPts val="0"/>
-              </a:spcBef>
-              <a:spcAft>
-                <a:spcPts val="1200"/>
-              </a:spcAft>
-            </a:pPr>
-            <a:r>
-              <a:rPr lang="zh-CN" altLang="en-US" sz="2000" dirty="0"/>
-              <a:t>优化方法：使用混合策略，提出</a:t>
-            </a:r>
-            <a:r>
-              <a:rPr lang="en-US" altLang="zh-CN" sz="2000" dirty="0"/>
-              <a:t>excess-four</a:t>
-            </a:r>
-            <a:r>
-              <a:rPr lang="zh-CN" altLang="en-US" sz="2000" dirty="0"/>
-              <a:t>电路结构</a:t>
-            </a:r>
-            <a:endParaRPr lang="en-US" altLang="zh-CN" sz="2000" dirty="0"/>
-          </a:p>
-        </p:txBody>
-      </p:sp>
-      <p:sp>
-        <p:nvSpPr>
-          <p:cNvPr id="9" name="文本框 8"/>
-          <p:cNvSpPr txBox="1"/>
-          <p:nvPr/>
-        </p:nvSpPr>
-        <p:spPr>
-          <a:xfrm>
-            <a:off x="175491" y="4562765"/>
-            <a:ext cx="8876145" cy="707886"/>
-          </a:xfrm>
-          <a:prstGeom prst="rect">
-            <a:avLst/>
-          </a:prstGeom>
-          <a:noFill/>
-        </p:spPr>
-        <p:txBody>
-          <a:bodyPr wrap="square" rtlCol="0">
-            <a:spAutoFit/>
-          </a:bodyPr>
-          <a:lstStyle/>
-          <a:p>
-            <a:r>
-              <a:rPr lang="en-US" altLang="zh-CN" sz="2000" dirty="0"/>
-              <a:t>[3] A 2 GHz 130 </a:t>
-            </a:r>
-            <a:r>
-              <a:rPr lang="en-US" altLang="zh-CN" sz="2000" dirty="0" err="1"/>
-              <a:t>mW</a:t>
-            </a:r>
-            <a:r>
-              <a:rPr lang="en-US" altLang="zh-CN" sz="2000" dirty="0"/>
-              <a:t> Direct-Digital Frequency Synthesizer With a Nonlinear DAC in 55 nm CMOS</a:t>
-            </a:r>
-          </a:p>
-        </p:txBody>
-      </p:sp>
-      <p:sp>
-        <p:nvSpPr>
-          <p:cNvPr id="10" name="内容占位符 2"/>
-          <p:cNvSpPr txBox="1">
-            <a:spLocks/>
-          </p:cNvSpPr>
-          <p:nvPr/>
-        </p:nvSpPr>
-        <p:spPr bwMode="auto">
-          <a:xfrm>
-            <a:off x="217055" y="5353778"/>
-            <a:ext cx="8686800" cy="5165725"/>
-          </a:xfrm>
-          <a:prstGeom prst="rect">
-            <a:avLst/>
-          </a:prstGeom>
-          <a:noFill/>
-          <a:ln w="9525">
-            <a:noFill/>
-            <a:miter lim="800000"/>
-            <a:headEnd/>
-            <a:tailEnd/>
-          </a:ln>
-          <a:effectLst/>
-        </p:spPr>
-        <p:txBody>
-          <a:bodyPr vert="horz" wrap="square" lIns="91440" tIns="45720" rIns="91440" bIns="45720" numCol="1" anchor="t" anchorCtr="0" compatLnSpc="1">
-            <a:prstTxWarp prst="textNoShape">
-              <a:avLst/>
-            </a:prstTxWarp>
-          </a:bodyPr>
-          <a:lstStyle>
-            <a:lvl1pPr marL="257175" indent="-257175" algn="l" rtl="0" fontAlgn="base">
-              <a:spcBef>
-                <a:spcPct val="20000"/>
-              </a:spcBef>
-              <a:spcAft>
-                <a:spcPct val="0"/>
-              </a:spcAft>
-              <a:buChar char="•"/>
-              <a:defRPr sz="2400">
-                <a:solidFill>
-                  <a:schemeClr val="tx1"/>
-                </a:solidFill>
-                <a:latin typeface="Arial Unicode MS" pitchFamily="34" charset="-122"/>
-                <a:ea typeface="Arial Unicode MS" pitchFamily="34" charset="-122"/>
-                <a:cs typeface="Arial Unicode MS" pitchFamily="34" charset="-122"/>
-              </a:defRPr>
-            </a:lvl1pPr>
-            <a:lvl2pPr marL="557213" indent="-214313" algn="l" rtl="0" fontAlgn="base">
-              <a:spcBef>
-                <a:spcPct val="20000"/>
-              </a:spcBef>
-              <a:spcAft>
-                <a:spcPct val="0"/>
-              </a:spcAft>
-              <a:buChar char="–"/>
-              <a:defRPr sz="2100">
-                <a:solidFill>
-                  <a:schemeClr val="tx1"/>
-                </a:solidFill>
-                <a:latin typeface="Arial Unicode MS" pitchFamily="34" charset="-122"/>
-                <a:ea typeface="Arial Unicode MS" pitchFamily="34" charset="-122"/>
-                <a:cs typeface="Arial Unicode MS" pitchFamily="34" charset="-122"/>
-              </a:defRPr>
-            </a:lvl2pPr>
-            <a:lvl3pPr marL="857250" indent="-171450" algn="l" rtl="0" fontAlgn="base">
-              <a:spcBef>
-                <a:spcPct val="20000"/>
-              </a:spcBef>
-              <a:spcAft>
-                <a:spcPct val="0"/>
-              </a:spcAft>
-              <a:buChar char="•"/>
-              <a:defRPr sz="1800">
-                <a:solidFill>
-                  <a:schemeClr val="tx1"/>
-                </a:solidFill>
-                <a:latin typeface="Arial Unicode MS" pitchFamily="34" charset="-122"/>
-                <a:ea typeface="Arial Unicode MS" pitchFamily="34" charset="-122"/>
-                <a:cs typeface="Arial Unicode MS" pitchFamily="34" charset="-122"/>
-              </a:defRPr>
-            </a:lvl3pPr>
-            <a:lvl4pPr marL="1200150" indent="-171450" algn="l" rtl="0" fontAlgn="base">
-              <a:spcBef>
-                <a:spcPct val="20000"/>
-              </a:spcBef>
-              <a:spcAft>
-                <a:spcPct val="0"/>
-              </a:spcAft>
-              <a:buChar char="–"/>
-              <a:defRPr sz="1500">
-                <a:solidFill>
-                  <a:schemeClr val="tx1"/>
-                </a:solidFill>
-                <a:latin typeface="Arial Unicode MS" pitchFamily="34" charset="-122"/>
-                <a:ea typeface="Arial Unicode MS" pitchFamily="34" charset="-122"/>
-                <a:cs typeface="Arial Unicode MS" pitchFamily="34" charset="-122"/>
-              </a:defRPr>
-            </a:lvl4pPr>
-            <a:lvl5pPr marL="1543050" indent="-171450" algn="l" rtl="0" fontAlgn="base">
-              <a:spcBef>
-                <a:spcPct val="20000"/>
-              </a:spcBef>
-              <a:spcAft>
-                <a:spcPct val="0"/>
-              </a:spcAft>
-              <a:buChar char="»"/>
-              <a:defRPr sz="1500">
-                <a:solidFill>
-                  <a:schemeClr val="tx1"/>
-                </a:solidFill>
-                <a:latin typeface="Arial Unicode MS" pitchFamily="34" charset="-122"/>
-                <a:ea typeface="Arial Unicode MS" pitchFamily="34" charset="-122"/>
-                <a:cs typeface="Arial Unicode MS" pitchFamily="34" charset="-122"/>
-              </a:defRPr>
-            </a:lvl5pPr>
-            <a:lvl6pPr marL="1885950" indent="-171450" algn="l" rtl="0" fontAlgn="base">
-              <a:spcBef>
-                <a:spcPct val="20000"/>
-              </a:spcBef>
-              <a:spcAft>
-                <a:spcPct val="0"/>
-              </a:spcAft>
-              <a:buChar char="»"/>
-              <a:defRPr sz="1500">
-                <a:solidFill>
-                  <a:schemeClr val="tx1"/>
-                </a:solidFill>
-                <a:latin typeface="+mn-lt"/>
-                <a:ea typeface="+mn-ea"/>
-              </a:defRPr>
-            </a:lvl6pPr>
-            <a:lvl7pPr marL="2228850" indent="-171450" algn="l" rtl="0" fontAlgn="base">
-              <a:spcBef>
-                <a:spcPct val="20000"/>
-              </a:spcBef>
-              <a:spcAft>
-                <a:spcPct val="0"/>
-              </a:spcAft>
-              <a:buChar char="»"/>
-              <a:defRPr sz="1500">
-                <a:solidFill>
-                  <a:schemeClr val="tx1"/>
-                </a:solidFill>
-                <a:latin typeface="+mn-lt"/>
-                <a:ea typeface="+mn-ea"/>
-              </a:defRPr>
-            </a:lvl7pPr>
-            <a:lvl8pPr marL="2571750" indent="-171450" algn="l" rtl="0" fontAlgn="base">
-              <a:spcBef>
-                <a:spcPct val="20000"/>
-              </a:spcBef>
-              <a:spcAft>
-                <a:spcPct val="0"/>
-              </a:spcAft>
-              <a:buChar char="»"/>
-              <a:defRPr sz="1500">
-                <a:solidFill>
-                  <a:schemeClr val="tx1"/>
-                </a:solidFill>
-                <a:latin typeface="+mn-lt"/>
-                <a:ea typeface="+mn-ea"/>
-              </a:defRPr>
-            </a:lvl8pPr>
-            <a:lvl9pPr marL="2914650" indent="-171450" algn="l" rtl="0" fontAlgn="base">
-              <a:spcBef>
-                <a:spcPct val="20000"/>
-              </a:spcBef>
-              <a:spcAft>
-                <a:spcPct val="0"/>
-              </a:spcAft>
-              <a:buChar char="»"/>
-              <a:defRPr sz="1500">
-                <a:solidFill>
-                  <a:schemeClr val="tx1"/>
-                </a:solidFill>
-                <a:latin typeface="+mn-lt"/>
-                <a:ea typeface="+mn-ea"/>
-              </a:defRPr>
-            </a:lvl9pPr>
-          </a:lstStyle>
-          <a:p>
-            <a:pPr>
-              <a:spcBef>
-                <a:spcPts val="0"/>
-              </a:spcBef>
-              <a:spcAft>
-                <a:spcPts val="1200"/>
-              </a:spcAft>
-            </a:pPr>
-            <a:r>
-              <a:rPr lang="zh-CN" altLang="en-US" sz="2000" dirty="0"/>
-              <a:t>面临问题：查找表和角度旋转方法，最长路径延时仍然很大</a:t>
-            </a:r>
-            <a:endParaRPr lang="en-US" altLang="zh-CN" sz="2000" dirty="0"/>
-          </a:p>
-          <a:p>
-            <a:pPr>
-              <a:spcBef>
-                <a:spcPts val="0"/>
-              </a:spcBef>
-              <a:spcAft>
-                <a:spcPts val="1200"/>
-              </a:spcAft>
-            </a:pPr>
-            <a:r>
-              <a:rPr lang="zh-CN" altLang="en-US" sz="2000" dirty="0"/>
-              <a:t>使用方法：使用非线性的</a:t>
-            </a:r>
-            <a:r>
-              <a:rPr lang="en-US" altLang="zh-CN" sz="2000" dirty="0"/>
-              <a:t>DAC</a:t>
-            </a:r>
-            <a:r>
-              <a:rPr lang="zh-CN" altLang="en-US" sz="2000" dirty="0"/>
-              <a:t>，压缩</a:t>
-            </a:r>
-            <a:r>
-              <a:rPr lang="en-US" altLang="zh-CN" sz="2000" dirty="0"/>
-              <a:t>DAC</a:t>
-            </a:r>
-            <a:r>
-              <a:rPr lang="zh-CN" altLang="en-US" sz="2000" dirty="0"/>
-              <a:t>中编解码器复杂度</a:t>
-            </a:r>
-            <a:endParaRPr lang="en-US" altLang="zh-CN" sz="2000" dirty="0"/>
+              </a:rPr>
+              <a:t>/14</a:t>
+            </a:r>
+            <a:endParaRPr lang="en-US" altLang="zh-CN" dirty="0">
+              <a:solidFill>
+                <a:srgbClr val="000000"/>
+              </a:solidFill>
+            </a:endParaRPr>
           </a:p>
         </p:txBody>
       </p:sp>
@@ -13725,8 +13783,28 @@
               </a:spcAft>
             </a:pPr>
             <a:r>
+              <a:rPr lang="zh-CN" altLang="en-US" dirty="0" smtClean="0"/>
+              <a:t>三</a:t>
+            </a:r>
+            <a:r>
               <a:rPr lang="zh-CN" altLang="en-US" dirty="0"/>
-              <a:t>从文献中可也体现了三种优化方法的融合：</a:t>
+              <a:t>种优化方法</a:t>
+            </a:r>
+            <a:r>
+              <a:rPr lang="zh-CN" altLang="en-US"/>
+              <a:t>的</a:t>
+            </a:r>
+            <a:r>
+              <a:rPr lang="zh-CN" altLang="en-US" smtClean="0"/>
+              <a:t>融合</a:t>
+            </a:r>
+            <a:r>
+              <a:rPr lang="zh-CN" altLang="en-US" smtClean="0"/>
+              <a:t>的趋势</a:t>
+            </a:r>
+            <a:r>
+              <a:rPr lang="zh-CN" altLang="en-US" smtClean="0"/>
+              <a:t>：</a:t>
             </a:r>
             <a:endParaRPr lang="en-US" altLang="zh-CN" dirty="0"/>
           </a:p>
@@ -13794,13 +13872,18 @@
           <a:lstStyle/>
           <a:p>
             <a:r>
-              <a:rPr lang="en-US" altLang="zh-CN" dirty="0">
+              <a:rPr lang="en-US" altLang="zh-CN" dirty="0" smtClean="0">
                 <a:solidFill>
                   <a:srgbClr val="000000"/>
                 </a:solidFill>
               </a:rPr>
-              <a:t>14/22</a:t>
-            </a:r>
+              <a:t>11/14</a:t>
+            </a:r>
+            <a:endParaRPr lang="en-US" altLang="zh-CN" dirty="0">
+              <a:solidFill>
+                <a:srgbClr val="000000"/>
+              </a:solidFill>
+            </a:endParaRPr>
           </a:p>
         </p:txBody>
       </p:sp>
@@ -13872,13 +13955,18 @@
           <a:lstStyle/>
           <a:p>
             <a:r>
-              <a:rPr lang="en-US" altLang="zh-CN" dirty="0">
+              <a:rPr lang="en-US" altLang="zh-CN" dirty="0" smtClean="0">
                 <a:solidFill>
                   <a:srgbClr val="000000"/>
                 </a:solidFill>
               </a:rPr>
-              <a:t>20/22</a:t>
-            </a:r>
+              <a:t>12/14</a:t>
+            </a:r>
+            <a:endParaRPr lang="en-US" altLang="zh-CN" dirty="0">
+              <a:solidFill>
+                <a:srgbClr val="000000"/>
+              </a:solidFill>
+            </a:endParaRPr>
           </a:p>
         </p:txBody>
       </p:sp>
@@ -13898,7 +13986,7 @@
         </p:blipFill>
         <p:spPr>
           <a:xfrm>
-            <a:off x="1337452" y="4832880"/>
+            <a:off x="1337452" y="4616496"/>
             <a:ext cx="6525347" cy="1546468"/>
           </a:xfrm>
           <a:prstGeom prst="rect">
@@ -14415,13 +14503,18 @@
           <a:lstStyle/>
           <a:p>
             <a:r>
-              <a:rPr lang="en-US" altLang="zh-CN" dirty="0">
+              <a:rPr lang="en-US" altLang="zh-CN" dirty="0" smtClean="0">
                 <a:solidFill>
                   <a:srgbClr val="000000"/>
                 </a:solidFill>
               </a:rPr>
-              <a:t>21/22</a:t>
-            </a:r>
+              <a:t>13/14</a:t>
+            </a:r>
+            <a:endParaRPr lang="en-US" altLang="zh-CN" dirty="0">
+              <a:solidFill>
+                <a:srgbClr val="000000"/>
+              </a:solidFill>
+            </a:endParaRPr>
           </a:p>
         </p:txBody>
       </p:sp>
@@ -14498,13 +14591,18 @@
           <a:lstStyle/>
           <a:p>
             <a:r>
-              <a:rPr lang="en-US" altLang="zh-CN" dirty="0">
+              <a:rPr lang="en-US" altLang="zh-CN" dirty="0" smtClean="0">
                 <a:solidFill>
                   <a:srgbClr val="000000"/>
                 </a:solidFill>
               </a:rPr>
-              <a:t>22/22</a:t>
-            </a:r>
+              <a:t>14/14</a:t>
+            </a:r>
+            <a:endParaRPr lang="en-US" altLang="zh-CN" dirty="0">
+              <a:solidFill>
+                <a:srgbClr val="000000"/>
+              </a:solidFill>
+            </a:endParaRPr>
           </a:p>
         </p:txBody>
       </p:sp>
@@ -14632,13 +14730,18 @@
           <a:lstStyle/>
           <a:p>
             <a:r>
-              <a:rPr lang="en-US" altLang="zh-CN" dirty="0">
+              <a:rPr lang="en-US" altLang="zh-CN" dirty="0" smtClean="0">
                 <a:solidFill>
                   <a:srgbClr val="000000"/>
                 </a:solidFill>
               </a:rPr>
-              <a:t>2/22</a:t>
-            </a:r>
+              <a:t>2/14</a:t>
+            </a:r>
+            <a:endParaRPr lang="en-US" altLang="zh-CN" dirty="0">
+              <a:solidFill>
+                <a:srgbClr val="000000"/>
+              </a:solidFill>
+            </a:endParaRPr>
           </a:p>
         </p:txBody>
       </p:sp>
@@ -14774,13 +14877,18 @@
           <a:lstStyle/>
           <a:p>
             <a:r>
-              <a:rPr lang="en-US" altLang="zh-CN" dirty="0">
+              <a:rPr lang="en-US" altLang="zh-CN" dirty="0" smtClean="0">
                 <a:solidFill>
                   <a:srgbClr val="000000"/>
                 </a:solidFill>
               </a:rPr>
-              <a:t>3/22</a:t>
-            </a:r>
+              <a:t>3/14</a:t>
+            </a:r>
+            <a:endParaRPr lang="en-US" altLang="zh-CN" dirty="0">
+              <a:solidFill>
+                <a:srgbClr val="000000"/>
+              </a:solidFill>
+            </a:endParaRPr>
           </a:p>
         </p:txBody>
       </p:sp>
@@ -15415,13 +15523,26 @@
           <a:lstStyle/>
           <a:p>
             <a:r>
-              <a:rPr lang="en-US" altLang="zh-CN" dirty="0">
+              <a:rPr lang="en-US" altLang="zh-CN" dirty="0" smtClean="0">
                 <a:solidFill>
                   <a:srgbClr val="000000"/>
                 </a:solidFill>
               </a:rPr>
-              <a:t>3/22</a:t>
-            </a:r>
+              <a:t>4</a:t>
+            </a:r>
+            <a:r>
+              <a:rPr lang="en-US" altLang="zh-CN" dirty="0" smtClean="0">
+                <a:solidFill>
+                  <a:srgbClr val="000000"/>
+                </a:solidFill>
+              </a:rPr>
+              <a:t>/14</a:t>
+            </a:r>
+            <a:endParaRPr lang="en-US" altLang="zh-CN" dirty="0">
+              <a:solidFill>
+                <a:srgbClr val="000000"/>
+              </a:solidFill>
+            </a:endParaRPr>
           </a:p>
         </p:txBody>
       </p:sp>
@@ -15967,13 +16088,26 @@
           <a:lstStyle/>
           <a:p>
             <a:r>
-              <a:rPr lang="en-US" altLang="zh-CN" dirty="0">
+              <a:rPr lang="en-US" altLang="zh-CN" dirty="0" smtClean="0">
                 <a:solidFill>
                   <a:srgbClr val="000000"/>
                 </a:solidFill>
               </a:rPr>
-              <a:t>4/22</a:t>
-            </a:r>
+              <a:t>5</a:t>
+            </a:r>
+            <a:r>
+              <a:rPr lang="en-US" altLang="zh-CN" dirty="0" smtClean="0">
+                <a:solidFill>
+                  <a:srgbClr val="000000"/>
+                </a:solidFill>
+              </a:rPr>
+              <a:t>/14</a:t>
+            </a:r>
+            <a:endParaRPr lang="en-US" altLang="zh-CN" dirty="0">
+              <a:solidFill>
+                <a:srgbClr val="000000"/>
+              </a:solidFill>
+            </a:endParaRPr>
           </a:p>
         </p:txBody>
       </p:sp>
@@ -18377,13 +18511,18 @@
           <a:lstStyle/>
           <a:p>
             <a:r>
-              <a:rPr lang="en-US" altLang="zh-CN" dirty="0">
+              <a:rPr lang="en-US" altLang="zh-CN" dirty="0" smtClean="0">
                 <a:solidFill>
                   <a:srgbClr val="000000"/>
                 </a:solidFill>
               </a:rPr>
-              <a:t>5/22</a:t>
-            </a:r>
+              <a:t>6/14</a:t>
+            </a:r>
+            <a:endParaRPr lang="en-US" altLang="zh-CN" dirty="0">
+              <a:solidFill>
+                <a:srgbClr val="000000"/>
+              </a:solidFill>
+            </a:endParaRPr>
           </a:p>
         </p:txBody>
       </p:sp>
@@ -18455,12 +18594,20 @@
           <a:lstStyle/>
           <a:p>
             <a:r>
-              <a:rPr lang="en-US" altLang="zh-CN">
+              <a:rPr lang="en-US" altLang="zh-CN" dirty="0" smtClean="0">
                 <a:solidFill>
                   <a:srgbClr val="000000"/>
                 </a:solidFill>
               </a:rPr>
-              <a:t>20/22</a:t>
+              <a:t>7</a:t>
+            </a:r>
+            <a:r>
+              <a:rPr lang="en-US" altLang="zh-CN" dirty="0" smtClean="0">
+                <a:solidFill>
+                  <a:srgbClr val="000000"/>
+                </a:solidFill>
+              </a:rPr>
+              <a:t>/14</a:t>
             </a:r>
             <a:endParaRPr lang="en-US" altLang="zh-CN" dirty="0">
               <a:solidFill>
@@ -18498,10 +18645,16 @@
               </a:spcAft>
             </a:pPr>
             <a:r>
+              <a:rPr lang="zh-CN" altLang="en-US" sz="2800" dirty="0" smtClean="0">
+                <a:ea typeface="Arial Unicode MS" pitchFamily="34" charset="-122"/>
+              </a:rPr>
+              <a:t>目标</a:t>
+            </a:r>
+            <a:r>
               <a:rPr lang="zh-CN" altLang="en-US" sz="2800" dirty="0">
                 <a:ea typeface="Arial Unicode MS" pitchFamily="34" charset="-122"/>
               </a:rPr>
-              <a:t>总目标：设计高速、高精度数控振荡器</a:t>
+              <a:t>：设计高速、高精度数控振荡器</a:t>
             </a:r>
             <a:endParaRPr lang="en-US" altLang="zh-CN" sz="2800" dirty="0">
               <a:ea typeface="Arial Unicode MS" pitchFamily="34" charset="-122"/>
@@ -18804,13 +18957,18 @@
           <a:lstStyle/>
           <a:p>
             <a:r>
-              <a:rPr lang="en-US" altLang="zh-CN" dirty="0">
+              <a:rPr lang="en-US" altLang="zh-CN" dirty="0" smtClean="0">
                 <a:solidFill>
                   <a:srgbClr val="000000"/>
                 </a:solidFill>
               </a:rPr>
-              <a:t>9/22</a:t>
-            </a:r>
+              <a:t>8/14</a:t>
+            </a:r>
+            <a:endParaRPr lang="en-US" altLang="zh-CN" dirty="0">
+              <a:solidFill>
+                <a:srgbClr val="000000"/>
+              </a:solidFill>
+            </a:endParaRPr>
           </a:p>
         </p:txBody>
       </p:sp>
@@ -19274,13 +19432,18 @@
           <a:lstStyle/>
           <a:p>
             <a:r>
-              <a:rPr lang="en-US" altLang="zh-CN" dirty="0">
+              <a:rPr lang="en-US" altLang="zh-CN" dirty="0" smtClean="0">
                 <a:solidFill>
                   <a:srgbClr val="000000"/>
                 </a:solidFill>
               </a:rPr>
-              <a:t>9/22</a:t>
-            </a:r>
+              <a:t>9/14</a:t>
+            </a:r>
+            <a:endParaRPr lang="en-US" altLang="zh-CN" dirty="0">
+              <a:solidFill>
+                <a:srgbClr val="000000"/>
+              </a:solidFill>
+            </a:endParaRPr>
           </a:p>
         </p:txBody>
       </p:sp>

</xml_diff>